<commit_message>
all-slides.pdf code.zip exceptions.pdf exceptions.pptx lambda.pdf lambda.pptx
</commit_message>
<xml_diff>
--- a/ipsa/slides/exceptions.pptx
+++ b/ipsa/slides/exceptions.pptx
@@ -147,13 +147,37 @@
 <file path=ppt/revisionInfo.xml><?xml version="1.0" encoding="utf-8"?>
 <p1510:revInfo xmlns:a="http://schemas.openxmlformats.org/drawingml/2006/main" xmlns:r="http://schemas.openxmlformats.org/officeDocument/2006/relationships" xmlns:p1510="http://schemas.microsoft.com/office/powerpoint/2015/10/main">
   <p1510:revLst>
-    <p1510:client id="{A6A9A378-5A9C-494E-9AFF-D5467651EA49}" v="37" dt="2024-11-20T09:21:49.083"/>
+    <p1510:client id="{9F458CB3-E497-4EBE-93FC-6326415FF9FB}" v="4" dt="2025-03-10T06:58:25.393"/>
   </p1510:revLst>
 </p1510:revInfo>
 </file>
 
 <file path=ppt/changesInfos/changesInfo1.xml><?xml version="1.0" encoding="utf-8"?>
 <pc:chgInfo xmlns:a="http://schemas.openxmlformats.org/drawingml/2006/main" xmlns:r="http://schemas.openxmlformats.org/officeDocument/2006/relationships" xmlns:ac="http://schemas.microsoft.com/office/drawing/2013/main/command" xmlns:pc="http://schemas.microsoft.com/office/powerpoint/2013/main/command">
+  <pc:docChgLst>
+    <pc:chgData name="Gerth Stølting Brodal" userId="04ef4784-6591-4f86-a140-f5c3b108582a" providerId="ADAL" clId="{9F458CB3-E497-4EBE-93FC-6326415FF9FB}"/>
+    <pc:docChg chg="custSel modSld">
+      <pc:chgData name="Gerth Stølting Brodal" userId="04ef4784-6591-4f86-a140-f5c3b108582a" providerId="ADAL" clId="{9F458CB3-E497-4EBE-93FC-6326415FF9FB}" dt="2025-03-10T06:59:00.692" v="85" actId="20577"/>
+      <pc:docMkLst>
+        <pc:docMk/>
+      </pc:docMkLst>
+      <pc:sldChg chg="modSp mod modNotesTx">
+        <pc:chgData name="Gerth Stølting Brodal" userId="04ef4784-6591-4f86-a140-f5c3b108582a" providerId="ADAL" clId="{9F458CB3-E497-4EBE-93FC-6326415FF9FB}" dt="2025-03-10T06:59:00.692" v="85" actId="20577"/>
+        <pc:sldMkLst>
+          <pc:docMk/>
+          <pc:sldMk cId="1654434957" sldId="704"/>
+        </pc:sldMkLst>
+        <pc:graphicFrameChg chg="mod modGraphic">
+          <ac:chgData name="Gerth Stølting Brodal" userId="04ef4784-6591-4f86-a140-f5c3b108582a" providerId="ADAL" clId="{9F458CB3-E497-4EBE-93FC-6326415FF9FB}" dt="2025-03-10T06:57:54.728" v="17" actId="20577"/>
+          <ac:graphicFrameMkLst>
+            <pc:docMk/>
+            <pc:sldMk cId="1654434957" sldId="704"/>
+            <ac:graphicFrameMk id="4" creationId="{00000000-0000-0000-0000-000000000000}"/>
+          </ac:graphicFrameMkLst>
+        </pc:graphicFrameChg>
+      </pc:sldChg>
+    </pc:docChg>
+  </pc:docChgLst>
   <pc:docChgLst>
     <pc:chgData name="Gerth Stølting Brodal" userId="04ef4784-6591-4f86-a140-f5c3b108582a" providerId="ADAL" clId="{0375A3B1-3E85-4265-A3F4-D5A88847E856}"/>
     <pc:docChg chg="undo custSel addSld delSld modSld">
@@ -167,14 +191,6 @@
           <pc:docMk/>
           <pc:sldMk cId="1038163257" sldId="475"/>
         </pc:sldMkLst>
-        <pc:spChg chg="mod">
-          <ac:chgData name="Gerth Stølting Brodal" userId="04ef4784-6591-4f86-a140-f5c3b108582a" providerId="ADAL" clId="{0375A3B1-3E85-4265-A3F4-D5A88847E856}" dt="2024-03-10T19:30:51.971" v="35" actId="20577"/>
-          <ac:spMkLst>
-            <pc:docMk/>
-            <pc:sldMk cId="1038163257" sldId="475"/>
-            <ac:spMk id="3" creationId="{00000000-0000-0000-0000-000000000000}"/>
-          </ac:spMkLst>
-        </pc:spChg>
       </pc:sldChg>
       <pc:sldChg chg="modSp mod">
         <pc:chgData name="Gerth Stølting Brodal" userId="04ef4784-6591-4f86-a140-f5c3b108582a" providerId="ADAL" clId="{0375A3B1-3E85-4265-A3F4-D5A88847E856}" dt="2024-03-10T19:43:50.086" v="38" actId="114"/>
@@ -182,14 +198,6 @@
           <pc:docMk/>
           <pc:sldMk cId="4179205861" sldId="512"/>
         </pc:sldMkLst>
-        <pc:spChg chg="mod">
-          <ac:chgData name="Gerth Stølting Brodal" userId="04ef4784-6591-4f86-a140-f5c3b108582a" providerId="ADAL" clId="{0375A3B1-3E85-4265-A3F4-D5A88847E856}" dt="2024-03-10T19:43:50.086" v="38" actId="114"/>
-          <ac:spMkLst>
-            <pc:docMk/>
-            <pc:sldMk cId="4179205861" sldId="512"/>
-            <ac:spMk id="2" creationId="{00000000-0000-0000-0000-000000000000}"/>
-          </ac:spMkLst>
-        </pc:spChg>
       </pc:sldChg>
       <pc:sldChg chg="modNotesTx">
         <pc:chgData name="Gerth Stølting Brodal" userId="04ef4784-6591-4f86-a140-f5c3b108582a" providerId="ADAL" clId="{0375A3B1-3E85-4265-A3F4-D5A88847E856}" dt="2024-03-10T20:09:27.833" v="325" actId="20577"/>
@@ -211,22 +219,6 @@
           <pc:docMk/>
           <pc:sldMk cId="926288180" sldId="716"/>
         </pc:sldMkLst>
-        <pc:spChg chg="mod">
-          <ac:chgData name="Gerth Stølting Brodal" userId="04ef4784-6591-4f86-a140-f5c3b108582a" providerId="ADAL" clId="{0375A3B1-3E85-4265-A3F4-D5A88847E856}" dt="2024-03-10T19:44:01.842" v="40" actId="114"/>
-          <ac:spMkLst>
-            <pc:docMk/>
-            <pc:sldMk cId="926288180" sldId="716"/>
-            <ac:spMk id="2" creationId="{00000000-0000-0000-0000-000000000000}"/>
-          </ac:spMkLst>
-        </pc:spChg>
-        <pc:spChg chg="mod">
-          <ac:chgData name="Gerth Stølting Brodal" userId="04ef4784-6591-4f86-a140-f5c3b108582a" providerId="ADAL" clId="{0375A3B1-3E85-4265-A3F4-D5A88847E856}" dt="2024-03-10T19:43:57.811" v="39" actId="114"/>
-          <ac:spMkLst>
-            <pc:docMk/>
-            <pc:sldMk cId="926288180" sldId="716"/>
-            <ac:spMk id="7" creationId="{00000000-0000-0000-0000-000000000000}"/>
-          </ac:spMkLst>
-        </pc:spChg>
       </pc:sldChg>
       <pc:sldChg chg="modSp mod">
         <pc:chgData name="Gerth Stølting Brodal" userId="04ef4784-6591-4f86-a140-f5c3b108582a" providerId="ADAL" clId="{0375A3B1-3E85-4265-A3F4-D5A88847E856}" dt="2024-03-10T19:50:19.213" v="108" actId="27636"/>
@@ -234,14 +226,6 @@
           <pc:docMk/>
           <pc:sldMk cId="3997418003" sldId="718"/>
         </pc:sldMkLst>
-        <pc:spChg chg="mod">
-          <ac:chgData name="Gerth Stølting Brodal" userId="04ef4784-6591-4f86-a140-f5c3b108582a" providerId="ADAL" clId="{0375A3B1-3E85-4265-A3F4-D5A88847E856}" dt="2024-03-10T19:50:19.213" v="108" actId="27636"/>
-          <ac:spMkLst>
-            <pc:docMk/>
-            <pc:sldMk cId="3997418003" sldId="718"/>
-            <ac:spMk id="3" creationId="{00000000-0000-0000-0000-000000000000}"/>
-          </ac:spMkLst>
-        </pc:spChg>
       </pc:sldChg>
       <pc:sldChg chg="modSp mod">
         <pc:chgData name="Gerth Stølting Brodal" userId="04ef4784-6591-4f86-a140-f5c3b108582a" providerId="ADAL" clId="{0375A3B1-3E85-4265-A3F4-D5A88847E856}" dt="2024-03-10T20:03:09.351" v="258"/>
@@ -249,22 +233,6 @@
           <pc:docMk/>
           <pc:sldMk cId="3379938229" sldId="720"/>
         </pc:sldMkLst>
-        <pc:spChg chg="mod">
-          <ac:chgData name="Gerth Stølting Brodal" userId="04ef4784-6591-4f86-a140-f5c3b108582a" providerId="ADAL" clId="{0375A3B1-3E85-4265-A3F4-D5A88847E856}" dt="2024-03-10T20:03:09.351" v="258"/>
-          <ac:spMkLst>
-            <pc:docMk/>
-            <pc:sldMk cId="3379938229" sldId="720"/>
-            <ac:spMk id="3" creationId="{00000000-0000-0000-0000-000000000000}"/>
-          </ac:spMkLst>
-        </pc:spChg>
-        <pc:graphicFrameChg chg="modGraphic">
-          <ac:chgData name="Gerth Stølting Brodal" userId="04ef4784-6591-4f86-a140-f5c3b108582a" providerId="ADAL" clId="{0375A3B1-3E85-4265-A3F4-D5A88847E856}" dt="2024-03-10T15:28:45.358" v="3" actId="20577"/>
-          <ac:graphicFrameMkLst>
-            <pc:docMk/>
-            <pc:sldMk cId="3379938229" sldId="720"/>
-            <ac:graphicFrameMk id="5" creationId="{00000000-0000-0000-0000-000000000000}"/>
-          </ac:graphicFrameMkLst>
-        </pc:graphicFrameChg>
       </pc:sldChg>
       <pc:sldChg chg="add">
         <pc:chgData name="Gerth Stølting Brodal" userId="04ef4784-6591-4f86-a140-f5c3b108582a" providerId="ADAL" clId="{0375A3B1-3E85-4265-A3F4-D5A88847E856}" dt="2024-03-10T19:32:20.737" v="37"/>
@@ -323,22 +291,6 @@
           <pc:docMk/>
           <pc:sldMk cId="4179205861" sldId="512"/>
         </pc:sldMkLst>
-        <pc:graphicFrameChg chg="modGraphic">
-          <ac:chgData name="Gerth Stølting Brodal" userId="04ef4784-6591-4f86-a140-f5c3b108582a" providerId="ADAL" clId="{D404FE24-4761-49EE-88D6-CDB48199D24C}" dt="2023-03-12T19:37:18.915" v="306" actId="20577"/>
-          <ac:graphicFrameMkLst>
-            <pc:docMk/>
-            <pc:sldMk cId="4179205861" sldId="512"/>
-            <ac:graphicFrameMk id="4" creationId="{00000000-0000-0000-0000-000000000000}"/>
-          </ac:graphicFrameMkLst>
-        </pc:graphicFrameChg>
-        <pc:graphicFrameChg chg="modGraphic">
-          <ac:chgData name="Gerth Stølting Brodal" userId="04ef4784-6591-4f86-a140-f5c3b108582a" providerId="ADAL" clId="{D404FE24-4761-49EE-88D6-CDB48199D24C}" dt="2023-03-10T22:42:57.725" v="42" actId="6549"/>
-          <ac:graphicFrameMkLst>
-            <pc:docMk/>
-            <pc:sldMk cId="4179205861" sldId="512"/>
-            <ac:graphicFrameMk id="5" creationId="{00000000-0000-0000-0000-000000000000}"/>
-          </ac:graphicFrameMkLst>
-        </pc:graphicFrameChg>
       </pc:sldChg>
       <pc:sldChg chg="modSp mod modNotesTx">
         <pc:chgData name="Gerth Stølting Brodal" userId="04ef4784-6591-4f86-a140-f5c3b108582a" providerId="ADAL" clId="{D404FE24-4761-49EE-88D6-CDB48199D24C}" dt="2023-03-12T19:26:49.058" v="255" actId="20577"/>
@@ -346,14 +298,6 @@
           <pc:docMk/>
           <pc:sldMk cId="1160923753" sldId="702"/>
         </pc:sldMkLst>
-        <pc:graphicFrameChg chg="mod modGraphic">
-          <ac:chgData name="Gerth Stølting Brodal" userId="04ef4784-6591-4f86-a140-f5c3b108582a" providerId="ADAL" clId="{D404FE24-4761-49EE-88D6-CDB48199D24C}" dt="2023-03-12T19:23:48.480" v="188"/>
-          <ac:graphicFrameMkLst>
-            <pc:docMk/>
-            <pc:sldMk cId="1160923753" sldId="702"/>
-            <ac:graphicFrameMk id="4" creationId="{00000000-0000-0000-0000-000000000000}"/>
-          </ac:graphicFrameMkLst>
-        </pc:graphicFrameChg>
       </pc:sldChg>
       <pc:sldChg chg="modSp mod modNotesTx">
         <pc:chgData name="Gerth Stølting Brodal" userId="04ef4784-6591-4f86-a140-f5c3b108582a" providerId="ADAL" clId="{D404FE24-4761-49EE-88D6-CDB48199D24C}" dt="2023-03-12T19:30:54.668" v="304" actId="20577"/>
@@ -361,14 +305,6 @@
           <pc:docMk/>
           <pc:sldMk cId="1654434957" sldId="704"/>
         </pc:sldMkLst>
-        <pc:graphicFrameChg chg="mod modGraphic">
-          <ac:chgData name="Gerth Stølting Brodal" userId="04ef4784-6591-4f86-a140-f5c3b108582a" providerId="ADAL" clId="{D404FE24-4761-49EE-88D6-CDB48199D24C}" dt="2023-03-10T22:35:05.139" v="11" actId="1076"/>
-          <ac:graphicFrameMkLst>
-            <pc:docMk/>
-            <pc:sldMk cId="1654434957" sldId="704"/>
-            <ac:graphicFrameMk id="4" creationId="{00000000-0000-0000-0000-000000000000}"/>
-          </ac:graphicFrameMkLst>
-        </pc:graphicFrameChg>
       </pc:sldChg>
       <pc:sldChg chg="modSp mod">
         <pc:chgData name="Gerth Stølting Brodal" userId="04ef4784-6591-4f86-a140-f5c3b108582a" providerId="ADAL" clId="{D404FE24-4761-49EE-88D6-CDB48199D24C}" dt="2023-03-10T22:35:46.730" v="15" actId="20577"/>
@@ -376,14 +312,6 @@
           <pc:docMk/>
           <pc:sldMk cId="2005488815" sldId="705"/>
         </pc:sldMkLst>
-        <pc:graphicFrameChg chg="mod modGraphic">
-          <ac:chgData name="Gerth Stølting Brodal" userId="04ef4784-6591-4f86-a140-f5c3b108582a" providerId="ADAL" clId="{D404FE24-4761-49EE-88D6-CDB48199D24C}" dt="2023-03-10T22:35:46.730" v="15" actId="20577"/>
-          <ac:graphicFrameMkLst>
-            <pc:docMk/>
-            <pc:sldMk cId="2005488815" sldId="705"/>
-            <ac:graphicFrameMk id="4" creationId="{00000000-0000-0000-0000-000000000000}"/>
-          </ac:graphicFrameMkLst>
-        </pc:graphicFrameChg>
       </pc:sldChg>
       <pc:sldChg chg="modSp mod">
         <pc:chgData name="Gerth Stølting Brodal" userId="04ef4784-6591-4f86-a140-f5c3b108582a" providerId="ADAL" clId="{D404FE24-4761-49EE-88D6-CDB48199D24C}" dt="2023-03-10T22:35:57.196" v="19" actId="20577"/>
@@ -391,14 +319,6 @@
           <pc:docMk/>
           <pc:sldMk cId="2852041830" sldId="706"/>
         </pc:sldMkLst>
-        <pc:graphicFrameChg chg="mod modGraphic">
-          <ac:chgData name="Gerth Stølting Brodal" userId="04ef4784-6591-4f86-a140-f5c3b108582a" providerId="ADAL" clId="{D404FE24-4761-49EE-88D6-CDB48199D24C}" dt="2023-03-10T22:35:57.196" v="19" actId="20577"/>
-          <ac:graphicFrameMkLst>
-            <pc:docMk/>
-            <pc:sldMk cId="2852041830" sldId="706"/>
-            <ac:graphicFrameMk id="4" creationId="{00000000-0000-0000-0000-000000000000}"/>
-          </ac:graphicFrameMkLst>
-        </pc:graphicFrameChg>
       </pc:sldChg>
       <pc:sldChg chg="modSp mod">
         <pc:chgData name="Gerth Stølting Brodal" userId="04ef4784-6591-4f86-a140-f5c3b108582a" providerId="ADAL" clId="{D404FE24-4761-49EE-88D6-CDB48199D24C}" dt="2023-03-10T23:31:38.787" v="170" actId="20577"/>
@@ -406,14 +326,6 @@
           <pc:docMk/>
           <pc:sldMk cId="753419617" sldId="707"/>
         </pc:sldMkLst>
-        <pc:graphicFrameChg chg="mod modGraphic">
-          <ac:chgData name="Gerth Stølting Brodal" userId="04ef4784-6591-4f86-a140-f5c3b108582a" providerId="ADAL" clId="{D404FE24-4761-49EE-88D6-CDB48199D24C}" dt="2023-03-10T23:31:38.787" v="170" actId="20577"/>
-          <ac:graphicFrameMkLst>
-            <pc:docMk/>
-            <pc:sldMk cId="753419617" sldId="707"/>
-            <ac:graphicFrameMk id="4" creationId="{00000000-0000-0000-0000-000000000000}"/>
-          </ac:graphicFrameMkLst>
-        </pc:graphicFrameChg>
       </pc:sldChg>
       <pc:sldChg chg="modSp mod">
         <pc:chgData name="Gerth Stølting Brodal" userId="04ef4784-6591-4f86-a140-f5c3b108582a" providerId="ADAL" clId="{D404FE24-4761-49EE-88D6-CDB48199D24C}" dt="2023-03-12T21:29:55.297" v="1645" actId="113"/>
@@ -421,22 +333,6 @@
           <pc:docMk/>
           <pc:sldMk cId="1330004482" sldId="708"/>
         </pc:sldMkLst>
-        <pc:spChg chg="mod">
-          <ac:chgData name="Gerth Stølting Brodal" userId="04ef4784-6591-4f86-a140-f5c3b108582a" providerId="ADAL" clId="{D404FE24-4761-49EE-88D6-CDB48199D24C}" dt="2023-03-12T21:29:55.297" v="1645" actId="113"/>
-          <ac:spMkLst>
-            <pc:docMk/>
-            <pc:sldMk cId="1330004482" sldId="708"/>
-            <ac:spMk id="2" creationId="{00000000-0000-0000-0000-000000000000}"/>
-          </ac:spMkLst>
-        </pc:spChg>
-        <pc:graphicFrameChg chg="mod modGraphic">
-          <ac:chgData name="Gerth Stølting Brodal" userId="04ef4784-6591-4f86-a140-f5c3b108582a" providerId="ADAL" clId="{D404FE24-4761-49EE-88D6-CDB48199D24C}" dt="2023-03-10T23:09:37.353" v="147" actId="1076"/>
-          <ac:graphicFrameMkLst>
-            <pc:docMk/>
-            <pc:sldMk cId="1330004482" sldId="708"/>
-            <ac:graphicFrameMk id="6" creationId="{00000000-0000-0000-0000-000000000000}"/>
-          </ac:graphicFrameMkLst>
-        </pc:graphicFrameChg>
       </pc:sldChg>
       <pc:sldChg chg="modSp mod">
         <pc:chgData name="Gerth Stølting Brodal" userId="04ef4784-6591-4f86-a140-f5c3b108582a" providerId="ADAL" clId="{D404FE24-4761-49EE-88D6-CDB48199D24C}" dt="2023-03-12T21:21:45.658" v="1611" actId="14100"/>
@@ -444,14 +340,6 @@
           <pc:docMk/>
           <pc:sldMk cId="1202853326" sldId="709"/>
         </pc:sldMkLst>
-        <pc:spChg chg="mod">
-          <ac:chgData name="Gerth Stølting Brodal" userId="04ef4784-6591-4f86-a140-f5c3b108582a" providerId="ADAL" clId="{D404FE24-4761-49EE-88D6-CDB48199D24C}" dt="2023-03-12T21:21:45.658" v="1611" actId="14100"/>
-          <ac:spMkLst>
-            <pc:docMk/>
-            <pc:sldMk cId="1202853326" sldId="709"/>
-            <ac:spMk id="3" creationId="{00000000-0000-0000-0000-000000000000}"/>
-          </ac:spMkLst>
-        </pc:spChg>
       </pc:sldChg>
       <pc:sldChg chg="modSp mod">
         <pc:chgData name="Gerth Stølting Brodal" userId="04ef4784-6591-4f86-a140-f5c3b108582a" providerId="ADAL" clId="{D404FE24-4761-49EE-88D6-CDB48199D24C}" dt="2023-03-12T20:42:21.741" v="1241" actId="20577"/>
@@ -459,14 +347,6 @@
           <pc:docMk/>
           <pc:sldMk cId="1043759414" sldId="710"/>
         </pc:sldMkLst>
-        <pc:graphicFrameChg chg="mod modGraphic">
-          <ac:chgData name="Gerth Stølting Brodal" userId="04ef4784-6591-4f86-a140-f5c3b108582a" providerId="ADAL" clId="{D404FE24-4761-49EE-88D6-CDB48199D24C}" dt="2023-03-12T20:42:21.741" v="1241" actId="20577"/>
-          <ac:graphicFrameMkLst>
-            <pc:docMk/>
-            <pc:sldMk cId="1043759414" sldId="710"/>
-            <ac:graphicFrameMk id="4" creationId="{00000000-0000-0000-0000-000000000000}"/>
-          </ac:graphicFrameMkLst>
-        </pc:graphicFrameChg>
       </pc:sldChg>
       <pc:sldChg chg="addSp modSp mod modNotesTx">
         <pc:chgData name="Gerth Stølting Brodal" userId="04ef4784-6591-4f86-a140-f5c3b108582a" providerId="ADAL" clId="{D404FE24-4761-49EE-88D6-CDB48199D24C}" dt="2023-03-12T21:29:50.671" v="1644" actId="113"/>
@@ -474,38 +354,6 @@
           <pc:docMk/>
           <pc:sldMk cId="2905942797" sldId="711"/>
         </pc:sldMkLst>
-        <pc:spChg chg="mod">
-          <ac:chgData name="Gerth Stølting Brodal" userId="04ef4784-6591-4f86-a140-f5c3b108582a" providerId="ADAL" clId="{D404FE24-4761-49EE-88D6-CDB48199D24C}" dt="2023-03-12T21:29:50.671" v="1644" actId="113"/>
-          <ac:spMkLst>
-            <pc:docMk/>
-            <pc:sldMk cId="2905942797" sldId="711"/>
-            <ac:spMk id="2" creationId="{00000000-0000-0000-0000-000000000000}"/>
-          </ac:spMkLst>
-        </pc:spChg>
-        <pc:spChg chg="mod">
-          <ac:chgData name="Gerth Stølting Brodal" userId="04ef4784-6591-4f86-a140-f5c3b108582a" providerId="ADAL" clId="{D404FE24-4761-49EE-88D6-CDB48199D24C}" dt="2023-03-12T21:09:51.733" v="1590" actId="6549"/>
-          <ac:spMkLst>
-            <pc:docMk/>
-            <pc:sldMk cId="2905942797" sldId="711"/>
-            <ac:spMk id="5" creationId="{00000000-0000-0000-0000-000000000000}"/>
-          </ac:spMkLst>
-        </pc:spChg>
-        <pc:spChg chg="add mod">
-          <ac:chgData name="Gerth Stølting Brodal" userId="04ef4784-6591-4f86-a140-f5c3b108582a" providerId="ADAL" clId="{D404FE24-4761-49EE-88D6-CDB48199D24C}" dt="2023-03-12T21:00:32.574" v="1356" actId="1076"/>
-          <ac:spMkLst>
-            <pc:docMk/>
-            <pc:sldMk cId="2905942797" sldId="711"/>
-            <ac:spMk id="9" creationId="{F903A0C6-1686-30B7-790B-EA7C3EC20FFE}"/>
-          </ac:spMkLst>
-        </pc:spChg>
-        <pc:graphicFrameChg chg="mod modGraphic">
-          <ac:chgData name="Gerth Stølting Brodal" userId="04ef4784-6591-4f86-a140-f5c3b108582a" providerId="ADAL" clId="{D404FE24-4761-49EE-88D6-CDB48199D24C}" dt="2023-03-12T20:44:33.554" v="1250" actId="20577"/>
-          <ac:graphicFrameMkLst>
-            <pc:docMk/>
-            <pc:sldMk cId="2905942797" sldId="711"/>
-            <ac:graphicFrameMk id="4" creationId="{00000000-0000-0000-0000-000000000000}"/>
-          </ac:graphicFrameMkLst>
-        </pc:graphicFrameChg>
       </pc:sldChg>
       <pc:sldChg chg="modSp mod">
         <pc:chgData name="Gerth Stølting Brodal" userId="04ef4784-6591-4f86-a140-f5c3b108582a" providerId="ADAL" clId="{D404FE24-4761-49EE-88D6-CDB48199D24C}" dt="2023-03-12T20:16:13.095" v="918" actId="20577"/>
@@ -513,14 +361,6 @@
           <pc:docMk/>
           <pc:sldMk cId="366870384" sldId="712"/>
         </pc:sldMkLst>
-        <pc:graphicFrameChg chg="modGraphic">
-          <ac:chgData name="Gerth Stølting Brodal" userId="04ef4784-6591-4f86-a140-f5c3b108582a" providerId="ADAL" clId="{D404FE24-4761-49EE-88D6-CDB48199D24C}" dt="2023-03-12T20:16:13.095" v="918" actId="20577"/>
-          <ac:graphicFrameMkLst>
-            <pc:docMk/>
-            <pc:sldMk cId="366870384" sldId="712"/>
-            <ac:graphicFrameMk id="4" creationId="{00000000-0000-0000-0000-000000000000}"/>
-          </ac:graphicFrameMkLst>
-        </pc:graphicFrameChg>
       </pc:sldChg>
       <pc:sldChg chg="modNotesTx">
         <pc:chgData name="Gerth Stølting Brodal" userId="04ef4784-6591-4f86-a140-f5c3b108582a" providerId="ADAL" clId="{D404FE24-4761-49EE-88D6-CDB48199D24C}" dt="2023-03-12T19:59:24.670" v="651" actId="113"/>
@@ -535,22 +375,6 @@
           <pc:docMk/>
           <pc:sldMk cId="2015921638" sldId="715"/>
         </pc:sldMkLst>
-        <pc:graphicFrameChg chg="modGraphic">
-          <ac:chgData name="Gerth Stølting Brodal" userId="04ef4784-6591-4f86-a140-f5c3b108582a" providerId="ADAL" clId="{D404FE24-4761-49EE-88D6-CDB48199D24C}" dt="2023-03-12T19:42:28.186" v="444" actId="207"/>
-          <ac:graphicFrameMkLst>
-            <pc:docMk/>
-            <pc:sldMk cId="2015921638" sldId="715"/>
-            <ac:graphicFrameMk id="33" creationId="{00000000-0000-0000-0000-000000000000}"/>
-          </ac:graphicFrameMkLst>
-        </pc:graphicFrameChg>
-        <pc:graphicFrameChg chg="modGraphic">
-          <ac:chgData name="Gerth Stølting Brodal" userId="04ef4784-6591-4f86-a140-f5c3b108582a" providerId="ADAL" clId="{D404FE24-4761-49EE-88D6-CDB48199D24C}" dt="2023-03-12T19:42:33.610" v="447" actId="207"/>
-          <ac:graphicFrameMkLst>
-            <pc:docMk/>
-            <pc:sldMk cId="2015921638" sldId="715"/>
-            <ac:graphicFrameMk id="34" creationId="{00000000-0000-0000-0000-000000000000}"/>
-          </ac:graphicFrameMkLst>
-        </pc:graphicFrameChg>
       </pc:sldChg>
       <pc:sldChg chg="modSp mod">
         <pc:chgData name="Gerth Stølting Brodal" userId="04ef4784-6591-4f86-a140-f5c3b108582a" providerId="ADAL" clId="{D404FE24-4761-49EE-88D6-CDB48199D24C}" dt="2023-03-12T19:37:34.556" v="311" actId="20577"/>
@@ -558,14 +382,6 @@
           <pc:docMk/>
           <pc:sldMk cId="926288180" sldId="716"/>
         </pc:sldMkLst>
-        <pc:graphicFrameChg chg="modGraphic">
-          <ac:chgData name="Gerth Stølting Brodal" userId="04ef4784-6591-4f86-a140-f5c3b108582a" providerId="ADAL" clId="{D404FE24-4761-49EE-88D6-CDB48199D24C}" dt="2023-03-12T19:37:34.556" v="311" actId="20577"/>
-          <ac:graphicFrameMkLst>
-            <pc:docMk/>
-            <pc:sldMk cId="926288180" sldId="716"/>
-            <ac:graphicFrameMk id="5" creationId="{00000000-0000-0000-0000-000000000000}"/>
-          </ac:graphicFrameMkLst>
-        </pc:graphicFrameChg>
       </pc:sldChg>
       <pc:sldChg chg="modSp mod">
         <pc:chgData name="Gerth Stølting Brodal" userId="04ef4784-6591-4f86-a140-f5c3b108582a" providerId="ADAL" clId="{D404FE24-4761-49EE-88D6-CDB48199D24C}" dt="2023-03-12T22:12:54.872" v="1662" actId="6549"/>
@@ -573,14 +389,6 @@
           <pc:docMk/>
           <pc:sldMk cId="2205391547" sldId="717"/>
         </pc:sldMkLst>
-        <pc:spChg chg="mod">
-          <ac:chgData name="Gerth Stølting Brodal" userId="04ef4784-6591-4f86-a140-f5c3b108582a" providerId="ADAL" clId="{D404FE24-4761-49EE-88D6-CDB48199D24C}" dt="2023-03-12T22:12:54.872" v="1662" actId="6549"/>
-          <ac:spMkLst>
-            <pc:docMk/>
-            <pc:sldMk cId="2205391547" sldId="717"/>
-            <ac:spMk id="3" creationId="{00000000-0000-0000-0000-000000000000}"/>
-          </ac:spMkLst>
-        </pc:spChg>
       </pc:sldChg>
       <pc:sldChg chg="modNotesTx">
         <pc:chgData name="Gerth Stølting Brodal" userId="04ef4784-6591-4f86-a140-f5c3b108582a" providerId="ADAL" clId="{D404FE24-4761-49EE-88D6-CDB48199D24C}" dt="2023-03-12T20:02:04.267" v="704" actId="20577"/>
@@ -595,46 +403,6 @@
           <pc:docMk/>
           <pc:sldMk cId="3379938229" sldId="720"/>
         </pc:sldMkLst>
-        <pc:spChg chg="mod">
-          <ac:chgData name="Gerth Stølting Brodal" userId="04ef4784-6591-4f86-a140-f5c3b108582a" providerId="ADAL" clId="{D404FE24-4761-49EE-88D6-CDB48199D24C}" dt="2023-03-10T23:02:22.329" v="136" actId="20577"/>
-          <ac:spMkLst>
-            <pc:docMk/>
-            <pc:sldMk cId="3379938229" sldId="720"/>
-            <ac:spMk id="2" creationId="{00000000-0000-0000-0000-000000000000}"/>
-          </ac:spMkLst>
-        </pc:spChg>
-        <pc:spChg chg="mod">
-          <ac:chgData name="Gerth Stølting Brodal" userId="04ef4784-6591-4f86-a140-f5c3b108582a" providerId="ADAL" clId="{D404FE24-4761-49EE-88D6-CDB48199D24C}" dt="2023-03-10T23:03:22.134" v="144" actId="313"/>
-          <ac:spMkLst>
-            <pc:docMk/>
-            <pc:sldMk cId="3379938229" sldId="720"/>
-            <ac:spMk id="36" creationId="{00000000-0000-0000-0000-000000000000}"/>
-          </ac:spMkLst>
-        </pc:spChg>
-        <pc:graphicFrameChg chg="mod modGraphic">
-          <ac:chgData name="Gerth Stølting Brodal" userId="04ef4784-6591-4f86-a140-f5c3b108582a" providerId="ADAL" clId="{D404FE24-4761-49EE-88D6-CDB48199D24C}" dt="2023-03-12T20:37:52.724" v="1095" actId="6549"/>
-          <ac:graphicFrameMkLst>
-            <pc:docMk/>
-            <pc:sldMk cId="3379938229" sldId="720"/>
-            <ac:graphicFrameMk id="4" creationId="{00000000-0000-0000-0000-000000000000}"/>
-          </ac:graphicFrameMkLst>
-        </pc:graphicFrameChg>
-        <pc:graphicFrameChg chg="mod modGraphic">
-          <ac:chgData name="Gerth Stølting Brodal" userId="04ef4784-6591-4f86-a140-f5c3b108582a" providerId="ADAL" clId="{D404FE24-4761-49EE-88D6-CDB48199D24C}" dt="2023-03-12T20:38:12.422" v="1101" actId="6549"/>
-          <ac:graphicFrameMkLst>
-            <pc:docMk/>
-            <pc:sldMk cId="3379938229" sldId="720"/>
-            <ac:graphicFrameMk id="5" creationId="{00000000-0000-0000-0000-000000000000}"/>
-          </ac:graphicFrameMkLst>
-        </pc:graphicFrameChg>
-        <pc:graphicFrameChg chg="mod modGraphic">
-          <ac:chgData name="Gerth Stølting Brodal" userId="04ef4784-6591-4f86-a140-f5c3b108582a" providerId="ADAL" clId="{D404FE24-4761-49EE-88D6-CDB48199D24C}" dt="2023-03-12T20:38:30.187" v="1113" actId="20577"/>
-          <ac:graphicFrameMkLst>
-            <pc:docMk/>
-            <pc:sldMk cId="3379938229" sldId="720"/>
-            <ac:graphicFrameMk id="6" creationId="{00000000-0000-0000-0000-000000000000}"/>
-          </ac:graphicFrameMkLst>
-        </pc:graphicFrameChg>
       </pc:sldChg>
       <pc:sldChg chg="modSp mod">
         <pc:chgData name="Gerth Stølting Brodal" userId="04ef4784-6591-4f86-a140-f5c3b108582a" providerId="ADAL" clId="{D404FE24-4761-49EE-88D6-CDB48199D24C}" dt="2023-03-10T22:36:19.416" v="33" actId="20577"/>
@@ -642,14 +410,6 @@
           <pc:docMk/>
           <pc:sldMk cId="1515186800" sldId="722"/>
         </pc:sldMkLst>
-        <pc:graphicFrameChg chg="mod modGraphic">
-          <ac:chgData name="Gerth Stølting Brodal" userId="04ef4784-6591-4f86-a140-f5c3b108582a" providerId="ADAL" clId="{D404FE24-4761-49EE-88D6-CDB48199D24C}" dt="2023-03-10T22:36:19.416" v="33" actId="20577"/>
-          <ac:graphicFrameMkLst>
-            <pc:docMk/>
-            <pc:sldMk cId="1515186800" sldId="722"/>
-            <ac:graphicFrameMk id="4" creationId="{00000000-0000-0000-0000-000000000000}"/>
-          </ac:graphicFrameMkLst>
-        </pc:graphicFrameChg>
       </pc:sldChg>
       <pc:sldChg chg="modSp mod">
         <pc:chgData name="Gerth Stølting Brodal" userId="04ef4784-6591-4f86-a140-f5c3b108582a" providerId="ADAL" clId="{D404FE24-4761-49EE-88D6-CDB48199D24C}" dt="2023-03-10T23:29:47.864" v="161" actId="20577"/>
@@ -657,22 +417,6 @@
           <pc:docMk/>
           <pc:sldMk cId="4063920540" sldId="723"/>
         </pc:sldMkLst>
-        <pc:graphicFrameChg chg="modGraphic">
-          <ac:chgData name="Gerth Stølting Brodal" userId="04ef4784-6591-4f86-a140-f5c3b108582a" providerId="ADAL" clId="{D404FE24-4761-49EE-88D6-CDB48199D24C}" dt="2023-03-10T23:29:47.864" v="161" actId="20577"/>
-          <ac:graphicFrameMkLst>
-            <pc:docMk/>
-            <pc:sldMk cId="4063920540" sldId="723"/>
-            <ac:graphicFrameMk id="4" creationId="{00000000-0000-0000-0000-000000000000}"/>
-          </ac:graphicFrameMkLst>
-        </pc:graphicFrameChg>
-        <pc:graphicFrameChg chg="mod modGraphic">
-          <ac:chgData name="Gerth Stølting Brodal" userId="04ef4784-6591-4f86-a140-f5c3b108582a" providerId="ADAL" clId="{D404FE24-4761-49EE-88D6-CDB48199D24C}" dt="2023-03-10T23:17:38.413" v="160" actId="20577"/>
-          <ac:graphicFrameMkLst>
-            <pc:docMk/>
-            <pc:sldMk cId="4063920540" sldId="723"/>
-            <ac:graphicFrameMk id="5" creationId="{00000000-0000-0000-0000-000000000000}"/>
-          </ac:graphicFrameMkLst>
-        </pc:graphicFrameChg>
       </pc:sldChg>
       <pc:sldChg chg="modSp mod">
         <pc:chgData name="Gerth Stølting Brodal" userId="04ef4784-6591-4f86-a140-f5c3b108582a" providerId="ADAL" clId="{D404FE24-4761-49EE-88D6-CDB48199D24C}" dt="2023-03-10T23:12:17.890" v="148" actId="14100"/>
@@ -680,14 +424,6 @@
           <pc:docMk/>
           <pc:sldMk cId="1799338885" sldId="726"/>
         </pc:sldMkLst>
-        <pc:spChg chg="mod">
-          <ac:chgData name="Gerth Stølting Brodal" userId="04ef4784-6591-4f86-a140-f5c3b108582a" providerId="ADAL" clId="{D404FE24-4761-49EE-88D6-CDB48199D24C}" dt="2023-03-10T23:12:17.890" v="148" actId="14100"/>
-          <ac:spMkLst>
-            <pc:docMk/>
-            <pc:sldMk cId="1799338885" sldId="726"/>
-            <ac:spMk id="3" creationId="{00000000-0000-0000-0000-000000000000}"/>
-          </ac:spMkLst>
-        </pc:spChg>
       </pc:sldChg>
       <pc:sldChg chg="modSp mod modNotesTx">
         <pc:chgData name="Gerth Stølting Brodal" userId="04ef4784-6591-4f86-a140-f5c3b108582a" providerId="ADAL" clId="{D404FE24-4761-49EE-88D6-CDB48199D24C}" dt="2023-03-13T10:16:49.555" v="1671" actId="207"/>
@@ -695,14 +431,6 @@
           <pc:docMk/>
           <pc:sldMk cId="3983956302" sldId="727"/>
         </pc:sldMkLst>
-        <pc:graphicFrameChg chg="modGraphic">
-          <ac:chgData name="Gerth Stølting Brodal" userId="04ef4784-6591-4f86-a140-f5c3b108582a" providerId="ADAL" clId="{D404FE24-4761-49EE-88D6-CDB48199D24C}" dt="2023-03-13T10:16:49.555" v="1671" actId="207"/>
-          <ac:graphicFrameMkLst>
-            <pc:docMk/>
-            <pc:sldMk cId="3983956302" sldId="727"/>
-            <ac:graphicFrameMk id="6" creationId="{00000000-0000-0000-0000-000000000000}"/>
-          </ac:graphicFrameMkLst>
-        </pc:graphicFrameChg>
       </pc:sldChg>
       <pc:sldChg chg="modSp mod">
         <pc:chgData name="Gerth Stølting Brodal" userId="04ef4784-6591-4f86-a140-f5c3b108582a" providerId="ADAL" clId="{D404FE24-4761-49EE-88D6-CDB48199D24C}" dt="2023-03-12T21:29:22.136" v="1639" actId="2711"/>
@@ -710,14 +438,6 @@
           <pc:docMk/>
           <pc:sldMk cId="2802748937" sldId="728"/>
         </pc:sldMkLst>
-        <pc:spChg chg="mod">
-          <ac:chgData name="Gerth Stølting Brodal" userId="04ef4784-6591-4f86-a140-f5c3b108582a" providerId="ADAL" clId="{D404FE24-4761-49EE-88D6-CDB48199D24C}" dt="2023-03-12T21:29:22.136" v="1639" actId="2711"/>
-          <ac:spMkLst>
-            <pc:docMk/>
-            <pc:sldMk cId="2802748937" sldId="728"/>
-            <ac:spMk id="2" creationId="{00000000-0000-0000-0000-000000000000}"/>
-          </ac:spMkLst>
-        </pc:spChg>
       </pc:sldChg>
       <pc:sldChg chg="modSp mod">
         <pc:chgData name="Gerth Stølting Brodal" userId="04ef4784-6591-4f86-a140-f5c3b108582a" providerId="ADAL" clId="{D404FE24-4761-49EE-88D6-CDB48199D24C}" dt="2023-03-13T10:12:02.216" v="1670" actId="20577"/>
@@ -725,30 +445,6 @@
           <pc:docMk/>
           <pc:sldMk cId="1881171177" sldId="729"/>
         </pc:sldMkLst>
-        <pc:spChg chg="mod">
-          <ac:chgData name="Gerth Stølting Brodal" userId="04ef4784-6591-4f86-a140-f5c3b108582a" providerId="ADAL" clId="{D404FE24-4761-49EE-88D6-CDB48199D24C}" dt="2023-03-12T21:29:37.873" v="1643" actId="14100"/>
-          <ac:spMkLst>
-            <pc:docMk/>
-            <pc:sldMk cId="1881171177" sldId="729"/>
-            <ac:spMk id="22" creationId="{0F5EA7B3-224C-47DD-BF5D-AD37DF2E1606}"/>
-          </ac:spMkLst>
-        </pc:spChg>
-        <pc:graphicFrameChg chg="mod modGraphic">
-          <ac:chgData name="Gerth Stølting Brodal" userId="04ef4784-6591-4f86-a140-f5c3b108582a" providerId="ADAL" clId="{D404FE24-4761-49EE-88D6-CDB48199D24C}" dt="2023-03-13T10:12:02.216" v="1670" actId="20577"/>
-          <ac:graphicFrameMkLst>
-            <pc:docMk/>
-            <pc:sldMk cId="1881171177" sldId="729"/>
-            <ac:graphicFrameMk id="4" creationId="{00000000-0000-0000-0000-000000000000}"/>
-          </ac:graphicFrameMkLst>
-        </pc:graphicFrameChg>
-        <pc:picChg chg="mod">
-          <ac:chgData name="Gerth Stølting Brodal" userId="04ef4784-6591-4f86-a140-f5c3b108582a" providerId="ADAL" clId="{D404FE24-4761-49EE-88D6-CDB48199D24C}" dt="2023-03-12T20:27:02.228" v="925" actId="1076"/>
-          <ac:picMkLst>
-            <pc:docMk/>
-            <pc:sldMk cId="1881171177" sldId="729"/>
-            <ac:picMk id="12" creationId="{CC3EB954-9B43-4116-B9AA-74E3C879861A}"/>
-          </ac:picMkLst>
-        </pc:picChg>
       </pc:sldChg>
       <pc:sldChg chg="modSp mod modNotesTx">
         <pc:chgData name="Gerth Stølting Brodal" userId="04ef4784-6591-4f86-a140-f5c3b108582a" providerId="ADAL" clId="{D404FE24-4761-49EE-88D6-CDB48199D24C}" dt="2023-03-13T10:11:51.777" v="1666" actId="20577"/>
@@ -756,14 +452,6 @@
           <pc:docMk/>
           <pc:sldMk cId="4113973945" sldId="730"/>
         </pc:sldMkLst>
-        <pc:graphicFrameChg chg="mod modGraphic">
-          <ac:chgData name="Gerth Stølting Brodal" userId="04ef4784-6591-4f86-a140-f5c3b108582a" providerId="ADAL" clId="{D404FE24-4761-49EE-88D6-CDB48199D24C}" dt="2023-03-13T10:11:51.777" v="1666" actId="20577"/>
-          <ac:graphicFrameMkLst>
-            <pc:docMk/>
-            <pc:sldMk cId="4113973945" sldId="730"/>
-            <ac:graphicFrameMk id="4" creationId="{1C79346D-4580-4415-A8DF-89103609571D}"/>
-          </ac:graphicFrameMkLst>
-        </pc:graphicFrameChg>
       </pc:sldChg>
       <pc:sldChg chg="new del">
         <pc:chgData name="Gerth Stølting Brodal" userId="04ef4784-6591-4f86-a140-f5c3b108582a" providerId="ADAL" clId="{D404FE24-4761-49EE-88D6-CDB48199D24C}" dt="2023-03-12T21:00:11.882" v="1346" actId="680"/>
@@ -787,14 +475,6 @@
           <pc:docMk/>
           <pc:sldMk cId="366870384" sldId="712"/>
         </pc:sldMkLst>
-        <pc:graphicFrameChg chg="modGraphic">
-          <ac:chgData name="Gerth Stølting Brodal" userId="04ef4784-6591-4f86-a140-f5c3b108582a" providerId="ADAL" clId="{64F0C171-2853-4A0E-8891-02A0F99F3D95}" dt="2021-03-09T11:27:14.088" v="3" actId="20577"/>
-          <ac:graphicFrameMkLst>
-            <pc:docMk/>
-            <pc:sldMk cId="366870384" sldId="712"/>
-            <ac:graphicFrameMk id="4" creationId="{00000000-0000-0000-0000-000000000000}"/>
-          </ac:graphicFrameMkLst>
-        </pc:graphicFrameChg>
       </pc:sldChg>
       <pc:sldChg chg="modSp mod">
         <pc:chgData name="Gerth Stølting Brodal" userId="04ef4784-6591-4f86-a140-f5c3b108582a" providerId="ADAL" clId="{64F0C171-2853-4A0E-8891-02A0F99F3D95}" dt="2021-03-09T11:36:46.481" v="57" actId="20577"/>
@@ -802,14 +482,6 @@
           <pc:docMk/>
           <pc:sldMk cId="2205391547" sldId="717"/>
         </pc:sldMkLst>
-        <pc:spChg chg="mod">
-          <ac:chgData name="Gerth Stølting Brodal" userId="04ef4784-6591-4f86-a140-f5c3b108582a" providerId="ADAL" clId="{64F0C171-2853-4A0E-8891-02A0F99F3D95}" dt="2021-03-09T11:36:46.481" v="57" actId="20577"/>
-          <ac:spMkLst>
-            <pc:docMk/>
-            <pc:sldMk cId="2205391547" sldId="717"/>
-            <ac:spMk id="3" creationId="{00000000-0000-0000-0000-000000000000}"/>
-          </ac:spMkLst>
-        </pc:spChg>
       </pc:sldChg>
       <pc:sldChg chg="modNotesTx">
         <pc:chgData name="Gerth Stølting Brodal" userId="04ef4784-6591-4f86-a140-f5c3b108582a" providerId="ADAL" clId="{64F0C171-2853-4A0E-8891-02A0F99F3D95}" dt="2021-03-09T11:31:55.752" v="44" actId="313"/>
@@ -824,14 +496,6 @@
           <pc:docMk/>
           <pc:sldMk cId="4063920540" sldId="723"/>
         </pc:sldMkLst>
-        <pc:spChg chg="del">
-          <ac:chgData name="Gerth Stølting Brodal" userId="04ef4784-6591-4f86-a140-f5c3b108582a" providerId="ADAL" clId="{64F0C171-2853-4A0E-8891-02A0F99F3D95}" dt="2021-03-09T11:50:49.674" v="190" actId="478"/>
-          <ac:spMkLst>
-            <pc:docMk/>
-            <pc:sldMk cId="4063920540" sldId="723"/>
-            <ac:spMk id="2" creationId="{00000000-0000-0000-0000-000000000000}"/>
-          </ac:spMkLst>
-        </pc:spChg>
       </pc:sldChg>
     </pc:docChg>
   </pc:docChgLst>
@@ -848,14 +512,6 @@
           <pc:docMk/>
           <pc:sldMk cId="1038163257" sldId="475"/>
         </pc:sldMkLst>
-        <pc:spChg chg="mod">
-          <ac:chgData name="Gerth Stølting Brodal" userId="04ef4784-6591-4f86-a140-f5c3b108582a" providerId="ADAL" clId="{4C2C2F4D-D6A3-49A4-83F7-63FF82F121FE}" dt="2022-03-13T16:02:54.566" v="1226" actId="20577"/>
-          <ac:spMkLst>
-            <pc:docMk/>
-            <pc:sldMk cId="1038163257" sldId="475"/>
-            <ac:spMk id="3" creationId="{00000000-0000-0000-0000-000000000000}"/>
-          </ac:spMkLst>
-        </pc:spChg>
       </pc:sldChg>
       <pc:sldChg chg="modSp mod">
         <pc:chgData name="Gerth Stølting Brodal" userId="04ef4784-6591-4f86-a140-f5c3b108582a" providerId="ADAL" clId="{4C2C2F4D-D6A3-49A4-83F7-63FF82F121FE}" dt="2022-03-10T16:14:57.165" v="0" actId="6549"/>
@@ -863,14 +519,6 @@
           <pc:docMk/>
           <pc:sldMk cId="1202853326" sldId="709"/>
         </pc:sldMkLst>
-        <pc:graphicFrameChg chg="modGraphic">
-          <ac:chgData name="Gerth Stølting Brodal" userId="04ef4784-6591-4f86-a140-f5c3b108582a" providerId="ADAL" clId="{4C2C2F4D-D6A3-49A4-83F7-63FF82F121FE}" dt="2022-03-10T16:14:57.165" v="0" actId="6549"/>
-          <ac:graphicFrameMkLst>
-            <pc:docMk/>
-            <pc:sldMk cId="1202853326" sldId="709"/>
-            <ac:graphicFrameMk id="5" creationId="{00000000-0000-0000-0000-000000000000}"/>
-          </ac:graphicFrameMkLst>
-        </pc:graphicFrameChg>
       </pc:sldChg>
       <pc:sldChg chg="del">
         <pc:chgData name="Gerth Stølting Brodal" userId="04ef4784-6591-4f86-a140-f5c3b108582a" providerId="ADAL" clId="{4C2C2F4D-D6A3-49A4-83F7-63FF82F121FE}" dt="2022-03-10T18:54:51.728" v="1" actId="47"/>
@@ -885,54 +533,6 @@
           <pc:docMk/>
           <pc:sldMk cId="2802748937" sldId="728"/>
         </pc:sldMkLst>
-        <pc:spChg chg="mod">
-          <ac:chgData name="Gerth Stølting Brodal" userId="04ef4784-6591-4f86-a140-f5c3b108582a" providerId="ADAL" clId="{4C2C2F4D-D6A3-49A4-83F7-63FF82F121FE}" dt="2022-03-10T18:56:07.781" v="48" actId="14100"/>
-          <ac:spMkLst>
-            <pc:docMk/>
-            <pc:sldMk cId="2802748937" sldId="728"/>
-            <ac:spMk id="2" creationId="{00000000-0000-0000-0000-000000000000}"/>
-          </ac:spMkLst>
-        </pc:spChg>
-        <pc:spChg chg="del mod">
-          <ac:chgData name="Gerth Stølting Brodal" userId="04ef4784-6591-4f86-a140-f5c3b108582a" providerId="ADAL" clId="{4C2C2F4D-D6A3-49A4-83F7-63FF82F121FE}" dt="2022-03-10T19:04:46.615" v="250" actId="478"/>
-          <ac:spMkLst>
-            <pc:docMk/>
-            <pc:sldMk cId="2802748937" sldId="728"/>
-            <ac:spMk id="3" creationId="{00000000-0000-0000-0000-000000000000}"/>
-          </ac:spMkLst>
-        </pc:spChg>
-        <pc:spChg chg="add mod">
-          <ac:chgData name="Gerth Stølting Brodal" userId="04ef4784-6591-4f86-a140-f5c3b108582a" providerId="ADAL" clId="{4C2C2F4D-D6A3-49A4-83F7-63FF82F121FE}" dt="2022-03-10T19:43:31.811" v="1007" actId="20577"/>
-          <ac:spMkLst>
-            <pc:docMk/>
-            <pc:sldMk cId="2802748937" sldId="728"/>
-            <ac:spMk id="6" creationId="{3F30EC32-55F0-49D5-8E09-EF677A939BA1}"/>
-          </ac:spMkLst>
-        </pc:spChg>
-        <pc:spChg chg="add del mod">
-          <ac:chgData name="Gerth Stølting Brodal" userId="04ef4784-6591-4f86-a140-f5c3b108582a" providerId="ADAL" clId="{4C2C2F4D-D6A3-49A4-83F7-63FF82F121FE}" dt="2022-03-10T19:04:49.957" v="251" actId="478"/>
-          <ac:spMkLst>
-            <pc:docMk/>
-            <pc:sldMk cId="2802748937" sldId="728"/>
-            <ac:spMk id="8" creationId="{D596853B-EE47-4DA9-868F-971DE4261FAA}"/>
-          </ac:spMkLst>
-        </pc:spChg>
-        <pc:graphicFrameChg chg="mod modGraphic">
-          <ac:chgData name="Gerth Stølting Brodal" userId="04ef4784-6591-4f86-a140-f5c3b108582a" providerId="ADAL" clId="{4C2C2F4D-D6A3-49A4-83F7-63FF82F121FE}" dt="2022-03-10T19:06:44.840" v="267" actId="1076"/>
-          <ac:graphicFrameMkLst>
-            <pc:docMk/>
-            <pc:sldMk cId="2802748937" sldId="728"/>
-            <ac:graphicFrameMk id="4" creationId="{00000000-0000-0000-0000-000000000000}"/>
-          </ac:graphicFrameMkLst>
-        </pc:graphicFrameChg>
-        <pc:graphicFrameChg chg="add mod modGraphic">
-          <ac:chgData name="Gerth Stølting Brodal" userId="04ef4784-6591-4f86-a140-f5c3b108582a" providerId="ADAL" clId="{4C2C2F4D-D6A3-49A4-83F7-63FF82F121FE}" dt="2022-03-14T07:56:44.945" v="1227" actId="20577"/>
-          <ac:graphicFrameMkLst>
-            <pc:docMk/>
-            <pc:sldMk cId="2802748937" sldId="728"/>
-            <ac:graphicFrameMk id="5" creationId="{A7A481A4-9355-47B1-B133-39B2CD357848}"/>
-          </ac:graphicFrameMkLst>
-        </pc:graphicFrameChg>
       </pc:sldChg>
       <pc:sldChg chg="addSp delSp modSp add mod">
         <pc:chgData name="Gerth Stølting Brodal" userId="04ef4784-6591-4f86-a140-f5c3b108582a" providerId="ADAL" clId="{4C2C2F4D-D6A3-49A4-83F7-63FF82F121FE}" dt="2022-03-10T19:59:49.061" v="1203" actId="14100"/>
@@ -940,102 +540,6 @@
           <pc:docMk/>
           <pc:sldMk cId="1881171177" sldId="729"/>
         </pc:sldMkLst>
-        <pc:spChg chg="del">
-          <ac:chgData name="Gerth Stølting Brodal" userId="04ef4784-6591-4f86-a140-f5c3b108582a" providerId="ADAL" clId="{4C2C2F4D-D6A3-49A4-83F7-63FF82F121FE}" dt="2022-03-10T19:13:26.031" v="357" actId="478"/>
-          <ac:spMkLst>
-            <pc:docMk/>
-            <pc:sldMk cId="1881171177" sldId="729"/>
-            <ac:spMk id="2" creationId="{00000000-0000-0000-0000-000000000000}"/>
-          </ac:spMkLst>
-        </pc:spChg>
-        <pc:spChg chg="del">
-          <ac:chgData name="Gerth Stølting Brodal" userId="04ef4784-6591-4f86-a140-f5c3b108582a" providerId="ADAL" clId="{4C2C2F4D-D6A3-49A4-83F7-63FF82F121FE}" dt="2022-03-10T19:13:26.031" v="357" actId="478"/>
-          <ac:spMkLst>
-            <pc:docMk/>
-            <pc:sldMk cId="1881171177" sldId="729"/>
-            <ac:spMk id="6" creationId="{3F30EC32-55F0-49D5-8E09-EF677A939BA1}"/>
-          </ac:spMkLst>
-        </pc:spChg>
-        <pc:spChg chg="add del mod">
-          <ac:chgData name="Gerth Stølting Brodal" userId="04ef4784-6591-4f86-a140-f5c3b108582a" providerId="ADAL" clId="{4C2C2F4D-D6A3-49A4-83F7-63FF82F121FE}" dt="2022-03-10T19:13:27.765" v="358" actId="478"/>
-          <ac:spMkLst>
-            <pc:docMk/>
-            <pc:sldMk cId="1881171177" sldId="729"/>
-            <ac:spMk id="7" creationId="{EDD2737D-00F3-49E5-8706-4C29C908FDD0}"/>
-          </ac:spMkLst>
-        </pc:spChg>
-        <pc:spChg chg="add del mod">
-          <ac:chgData name="Gerth Stølting Brodal" userId="04ef4784-6591-4f86-a140-f5c3b108582a" providerId="ADAL" clId="{4C2C2F4D-D6A3-49A4-83F7-63FF82F121FE}" dt="2022-03-10T19:39:03.229" v="647" actId="478"/>
-          <ac:spMkLst>
-            <pc:docMk/>
-            <pc:sldMk cId="1881171177" sldId="729"/>
-            <ac:spMk id="10" creationId="{253D05F7-9AEE-46A1-9F1A-784B001D9D77}"/>
-          </ac:spMkLst>
-        </pc:spChg>
-        <pc:spChg chg="add mod">
-          <ac:chgData name="Gerth Stølting Brodal" userId="04ef4784-6591-4f86-a140-f5c3b108582a" providerId="ADAL" clId="{4C2C2F4D-D6A3-49A4-83F7-63FF82F121FE}" dt="2022-03-10T19:39:10.615" v="649" actId="14100"/>
-          <ac:spMkLst>
-            <pc:docMk/>
-            <pc:sldMk cId="1881171177" sldId="729"/>
-            <ac:spMk id="22" creationId="{0F5EA7B3-224C-47DD-BF5D-AD37DF2E1606}"/>
-          </ac:spMkLst>
-        </pc:spChg>
-        <pc:spChg chg="add mod">
-          <ac:chgData name="Gerth Stølting Brodal" userId="04ef4784-6591-4f86-a140-f5c3b108582a" providerId="ADAL" clId="{4C2C2F4D-D6A3-49A4-83F7-63FF82F121FE}" dt="2022-03-10T19:59:49.061" v="1203" actId="14100"/>
-          <ac:spMkLst>
-            <pc:docMk/>
-            <pc:sldMk cId="1881171177" sldId="729"/>
-            <ac:spMk id="23" creationId="{939C6EA6-78C2-4D8F-82B7-6DC15D0BBD6D}"/>
-          </ac:spMkLst>
-        </pc:spChg>
-        <pc:graphicFrameChg chg="mod ord modGraphic">
-          <ac:chgData name="Gerth Stølting Brodal" userId="04ef4784-6591-4f86-a140-f5c3b108582a" providerId="ADAL" clId="{4C2C2F4D-D6A3-49A4-83F7-63FF82F121FE}" dt="2022-03-10T19:52:41.931" v="1111" actId="1038"/>
-          <ac:graphicFrameMkLst>
-            <pc:docMk/>
-            <pc:sldMk cId="1881171177" sldId="729"/>
-            <ac:graphicFrameMk id="4" creationId="{00000000-0000-0000-0000-000000000000}"/>
-          </ac:graphicFrameMkLst>
-        </pc:graphicFrameChg>
-        <pc:graphicFrameChg chg="del">
-          <ac:chgData name="Gerth Stølting Brodal" userId="04ef4784-6591-4f86-a140-f5c3b108582a" providerId="ADAL" clId="{4C2C2F4D-D6A3-49A4-83F7-63FF82F121FE}" dt="2022-03-10T19:13:50.203" v="361" actId="478"/>
-          <ac:graphicFrameMkLst>
-            <pc:docMk/>
-            <pc:sldMk cId="1881171177" sldId="729"/>
-            <ac:graphicFrameMk id="5" creationId="{A7A481A4-9355-47B1-B133-39B2CD357848}"/>
-          </ac:graphicFrameMkLst>
-        </pc:graphicFrameChg>
-        <pc:graphicFrameChg chg="add mod modGraphic">
-          <ac:chgData name="Gerth Stølting Brodal" userId="04ef4784-6591-4f86-a140-f5c3b108582a" providerId="ADAL" clId="{4C2C2F4D-D6A3-49A4-83F7-63FF82F121FE}" dt="2022-03-10T19:52:41.931" v="1111" actId="1038"/>
-          <ac:graphicFrameMkLst>
-            <pc:docMk/>
-            <pc:sldMk cId="1881171177" sldId="729"/>
-            <ac:graphicFrameMk id="8" creationId="{E6A75348-9395-4855-8417-5D974901E868}"/>
-          </ac:graphicFrameMkLst>
-        </pc:graphicFrameChg>
-        <pc:picChg chg="add mod">
-          <ac:chgData name="Gerth Stølting Brodal" userId="04ef4784-6591-4f86-a140-f5c3b108582a" providerId="ADAL" clId="{4C2C2F4D-D6A3-49A4-83F7-63FF82F121FE}" dt="2022-03-10T19:52:41.931" v="1111" actId="1038"/>
-          <ac:picMkLst>
-            <pc:docMk/>
-            <pc:sldMk cId="1881171177" sldId="729"/>
-            <ac:picMk id="12" creationId="{CC3EB954-9B43-4116-B9AA-74E3C879861A}"/>
-          </ac:picMkLst>
-        </pc:picChg>
-        <pc:cxnChg chg="add mod">
-          <ac:chgData name="Gerth Stølting Brodal" userId="04ef4784-6591-4f86-a140-f5c3b108582a" providerId="ADAL" clId="{4C2C2F4D-D6A3-49A4-83F7-63FF82F121FE}" dt="2022-03-10T19:52:41.931" v="1111" actId="1038"/>
-          <ac:cxnSpMkLst>
-            <pc:docMk/>
-            <pc:sldMk cId="1881171177" sldId="729"/>
-            <ac:cxnSpMk id="9" creationId="{17737FDD-DF5B-4C54-9737-182C49F01611}"/>
-          </ac:cxnSpMkLst>
-        </pc:cxnChg>
-        <pc:cxnChg chg="add mod">
-          <ac:chgData name="Gerth Stølting Brodal" userId="04ef4784-6591-4f86-a140-f5c3b108582a" providerId="ADAL" clId="{4C2C2F4D-D6A3-49A4-83F7-63FF82F121FE}" dt="2022-03-10T19:52:41.931" v="1111" actId="1038"/>
-          <ac:cxnSpMkLst>
-            <pc:docMk/>
-            <pc:sldMk cId="1881171177" sldId="729"/>
-            <ac:cxnSpMk id="13" creationId="{4C09251D-D62B-4408-8D3E-9669B9B398E0}"/>
-          </ac:cxnSpMkLst>
-        </pc:cxnChg>
       </pc:sldChg>
       <pc:sldChg chg="addSp delSp modSp new mod">
         <pc:chgData name="Gerth Stølting Brodal" userId="04ef4784-6591-4f86-a140-f5c3b108582a" providerId="ADAL" clId="{4C2C2F4D-D6A3-49A4-83F7-63FF82F121FE}" dt="2022-03-10T19:58:44.375" v="1199" actId="20577"/>
@@ -1043,30 +547,6 @@
           <pc:docMk/>
           <pc:sldMk cId="4113973945" sldId="730"/>
         </pc:sldMkLst>
-        <pc:spChg chg="del">
-          <ac:chgData name="Gerth Stølting Brodal" userId="04ef4784-6591-4f86-a140-f5c3b108582a" providerId="ADAL" clId="{4C2C2F4D-D6A3-49A4-83F7-63FF82F121FE}" dt="2022-03-10T19:55:14.351" v="1127" actId="478"/>
-          <ac:spMkLst>
-            <pc:docMk/>
-            <pc:sldMk cId="4113973945" sldId="730"/>
-            <ac:spMk id="2" creationId="{5C540A7E-AB3C-4AD0-9DC7-41CD0B87156C}"/>
-          </ac:spMkLst>
-        </pc:spChg>
-        <pc:spChg chg="del">
-          <ac:chgData name="Gerth Stølting Brodal" userId="04ef4784-6591-4f86-a140-f5c3b108582a" providerId="ADAL" clId="{4C2C2F4D-D6A3-49A4-83F7-63FF82F121FE}" dt="2022-03-10T19:55:14.351" v="1127" actId="478"/>
-          <ac:spMkLst>
-            <pc:docMk/>
-            <pc:sldMk cId="4113973945" sldId="730"/>
-            <ac:spMk id="3" creationId="{62978D14-9004-4325-BB93-C1BD2FA4AC3E}"/>
-          </ac:spMkLst>
-        </pc:spChg>
-        <pc:graphicFrameChg chg="add mod modGraphic">
-          <ac:chgData name="Gerth Stølting Brodal" userId="04ef4784-6591-4f86-a140-f5c3b108582a" providerId="ADAL" clId="{4C2C2F4D-D6A3-49A4-83F7-63FF82F121FE}" dt="2022-03-10T19:58:44.375" v="1199" actId="20577"/>
-          <ac:graphicFrameMkLst>
-            <pc:docMk/>
-            <pc:sldMk cId="4113973945" sldId="730"/>
-            <ac:graphicFrameMk id="4" creationId="{1C79346D-4580-4415-A8DF-89103609571D}"/>
-          </ac:graphicFrameMkLst>
-        </pc:graphicFrameChg>
       </pc:sldChg>
     </pc:docChg>
   </pc:docChgLst>
@@ -1083,14 +563,6 @@
           <pc:docMk/>
           <pc:sldMk cId="2905942797" sldId="711"/>
         </pc:sldMkLst>
-        <pc:spChg chg="mod">
-          <ac:chgData name="Gerth Stølting Brodal" userId="04ef4784-6591-4f86-a140-f5c3b108582a" providerId="ADAL" clId="{A6A9A378-5A9C-494E-9AFF-D5467651EA49}" dt="2024-11-20T08:09:51.304" v="45" actId="20577"/>
-          <ac:spMkLst>
-            <pc:docMk/>
-            <pc:sldMk cId="2905942797" sldId="711"/>
-            <ac:spMk id="2" creationId="{00000000-0000-0000-0000-000000000000}"/>
-          </ac:spMkLst>
-        </pc:spChg>
       </pc:sldChg>
       <pc:sldChg chg="ord">
         <pc:chgData name="Gerth Stølting Brodal" userId="04ef4784-6591-4f86-a140-f5c3b108582a" providerId="ADAL" clId="{A6A9A378-5A9C-494E-9AFF-D5467651EA49}" dt="2024-11-20T08:09:32.368" v="41"/>
@@ -1105,46 +577,6 @@
           <pc:docMk/>
           <pc:sldMk cId="1833727466" sldId="731"/>
         </pc:sldMkLst>
-        <pc:spChg chg="mod">
-          <ac:chgData name="Gerth Stølting Brodal" userId="04ef4784-6591-4f86-a140-f5c3b108582a" providerId="ADAL" clId="{A6A9A378-5A9C-494E-9AFF-D5467651EA49}" dt="2024-11-20T08:27:28.313" v="455" actId="14100"/>
-          <ac:spMkLst>
-            <pc:docMk/>
-            <pc:sldMk cId="1833727466" sldId="731"/>
-            <ac:spMk id="2" creationId="{C5893043-CC40-B57B-3459-60612813E8BC}"/>
-          </ac:spMkLst>
-        </pc:spChg>
-        <pc:spChg chg="add del mod">
-          <ac:chgData name="Gerth Stølting Brodal" userId="04ef4784-6591-4f86-a140-f5c3b108582a" providerId="ADAL" clId="{A6A9A378-5A9C-494E-9AFF-D5467651EA49}" dt="2024-11-20T09:35:21.931" v="997" actId="1035"/>
-          <ac:spMkLst>
-            <pc:docMk/>
-            <pc:sldMk cId="1833727466" sldId="731"/>
-            <ac:spMk id="3" creationId="{188647D0-71E6-5120-EF3B-FA797DEB2E9A}"/>
-          </ac:spMkLst>
-        </pc:spChg>
-        <pc:spChg chg="add del mod">
-          <ac:chgData name="Gerth Stølting Brodal" userId="04ef4784-6591-4f86-a140-f5c3b108582a" providerId="ADAL" clId="{A6A9A378-5A9C-494E-9AFF-D5467651EA49}" dt="2024-11-20T08:22:13.200" v="351" actId="478"/>
-          <ac:spMkLst>
-            <pc:docMk/>
-            <pc:sldMk cId="1833727466" sldId="731"/>
-            <ac:spMk id="6" creationId="{4D8F53F9-29EB-05A5-5E0C-124DAEA43958}"/>
-          </ac:spMkLst>
-        </pc:spChg>
-        <pc:graphicFrameChg chg="mod modGraphic">
-          <ac:chgData name="Gerth Stølting Brodal" userId="04ef4784-6591-4f86-a140-f5c3b108582a" providerId="ADAL" clId="{A6A9A378-5A9C-494E-9AFF-D5467651EA49}" dt="2024-11-20T09:30:13.928" v="949" actId="1076"/>
-          <ac:graphicFrameMkLst>
-            <pc:docMk/>
-            <pc:sldMk cId="1833727466" sldId="731"/>
-            <ac:graphicFrameMk id="5" creationId="{76DB784C-D612-34E4-0A37-66CE80B06D90}"/>
-          </ac:graphicFrameMkLst>
-        </pc:graphicFrameChg>
-        <pc:graphicFrameChg chg="mod modGraphic">
-          <ac:chgData name="Gerth Stølting Brodal" userId="04ef4784-6591-4f86-a140-f5c3b108582a" providerId="ADAL" clId="{A6A9A378-5A9C-494E-9AFF-D5467651EA49}" dt="2024-11-20T09:16:28.524" v="761" actId="1076"/>
-          <ac:graphicFrameMkLst>
-            <pc:docMk/>
-            <pc:sldMk cId="1833727466" sldId="731"/>
-            <ac:graphicFrameMk id="7" creationId="{F1B9F700-5C92-7F12-EDC7-0E6EBCB299A2}"/>
-          </ac:graphicFrameMkLst>
-        </pc:graphicFrameChg>
       </pc:sldChg>
     </pc:docChg>
   </pc:docChgLst>
@@ -1233,7 +665,7 @@
           <a:p>
             <a:fld id="{FB1A172F-81D4-4DC4-9113-1DBD56EC3646}" type="datetimeFigureOut">
               <a:rPr lang="en-US" smtClean="0"/>
-              <a:t>11/20/2024</a:t>
+              <a:t>3/10/2025</a:t>
             </a:fld>
             <a:endParaRPr lang="en-US"/>
           </a:p>
@@ -3072,11 +2504,42 @@
           <a:bodyPr/>
           <a:lstStyle/>
           <a:p>
+            <a:pPr marL="0" marR="0" lvl="0" indent="0" algn="l" defTabSz="914400" rtl="0" eaLnBrk="1" fontAlgn="auto" latinLnBrk="0" hangingPunct="1">
+              <a:lnSpc>
+                <a:spcPct val="100000"/>
+              </a:lnSpc>
+              <a:spcBef>
+                <a:spcPts val="0"/>
+              </a:spcBef>
+              <a:spcAft>
+                <a:spcPts val="0"/>
+              </a:spcAft>
+              <a:buClrTx/>
+              <a:buSzTx/>
+              <a:buFontTx/>
+              <a:buNone/>
+              <a:tabLst/>
+              <a:defRPr/>
+            </a:pPr>
+            <a:r>
+              <a:rPr lang="en-US" dirty="0"/>
+              <a:t>Program crashes… Goal: catch </a:t>
+            </a:r>
+            <a:r>
+              <a:rPr lang="en-US" dirty="0" err="1"/>
+              <a:t>misbehavioring</a:t>
+            </a:r>
+            <a:r>
+              <a:rPr lang="en-US" dirty="0"/>
+              <a:t> users</a:t>
+            </a:r>
+            <a:endParaRPr lang="da-DK" dirty="0"/>
+          </a:p>
+          <a:p>
             <a:r>
               <a:rPr lang="en-US" dirty="0"/>
               <a:t>1/4 versions of the program</a:t>
             </a:r>
-            <a:endParaRPr lang="da-DK" dirty="0"/>
           </a:p>
         </p:txBody>
       </p:sp>
@@ -3880,7 +3343,7 @@
           <a:p>
             <a:fld id="{0560A9CD-0304-4E0B-9E82-E7E0115DE05B}" type="datetimeFigureOut">
               <a:rPr lang="en-US" smtClean="0"/>
-              <a:t>11/20/2024</a:t>
+              <a:t>3/10/2025</a:t>
             </a:fld>
             <a:endParaRPr lang="en-US"/>
           </a:p>
@@ -4048,7 +3511,7 @@
           <a:p>
             <a:fld id="{0560A9CD-0304-4E0B-9E82-E7E0115DE05B}" type="datetimeFigureOut">
               <a:rPr lang="en-US" smtClean="0"/>
-              <a:t>11/20/2024</a:t>
+              <a:t>3/10/2025</a:t>
             </a:fld>
             <a:endParaRPr lang="en-US"/>
           </a:p>
@@ -4226,7 +3689,7 @@
           <a:p>
             <a:fld id="{0560A9CD-0304-4E0B-9E82-E7E0115DE05B}" type="datetimeFigureOut">
               <a:rPr lang="en-US" smtClean="0"/>
-              <a:t>11/20/2024</a:t>
+              <a:t>3/10/2025</a:t>
             </a:fld>
             <a:endParaRPr lang="en-US"/>
           </a:p>
@@ -4409,7 +3872,7 @@
           <a:p>
             <a:fld id="{0560A9CD-0304-4E0B-9E82-E7E0115DE05B}" type="datetimeFigureOut">
               <a:rPr lang="en-US" smtClean="0"/>
-              <a:t>11/20/2024</a:t>
+              <a:t>3/10/2025</a:t>
             </a:fld>
             <a:endParaRPr lang="en-US"/>
           </a:p>
@@ -4654,7 +4117,7 @@
           <a:p>
             <a:fld id="{0560A9CD-0304-4E0B-9E82-E7E0115DE05B}" type="datetimeFigureOut">
               <a:rPr lang="en-US" smtClean="0"/>
-              <a:t>11/20/2024</a:t>
+              <a:t>3/10/2025</a:t>
             </a:fld>
             <a:endParaRPr lang="en-US"/>
           </a:p>
@@ -4883,7 +4346,7 @@
           <a:p>
             <a:fld id="{0560A9CD-0304-4E0B-9E82-E7E0115DE05B}" type="datetimeFigureOut">
               <a:rPr lang="en-US" smtClean="0"/>
-              <a:t>11/20/2024</a:t>
+              <a:t>3/10/2025</a:t>
             </a:fld>
             <a:endParaRPr lang="en-US"/>
           </a:p>
@@ -5247,7 +4710,7 @@
           <a:p>
             <a:fld id="{0560A9CD-0304-4E0B-9E82-E7E0115DE05B}" type="datetimeFigureOut">
               <a:rPr lang="en-US" smtClean="0"/>
-              <a:t>11/20/2024</a:t>
+              <a:t>3/10/2025</a:t>
             </a:fld>
             <a:endParaRPr lang="en-US"/>
           </a:p>
@@ -5364,7 +4827,7 @@
           <a:p>
             <a:fld id="{0560A9CD-0304-4E0B-9E82-E7E0115DE05B}" type="datetimeFigureOut">
               <a:rPr lang="en-US" smtClean="0"/>
-              <a:t>11/20/2024</a:t>
+              <a:t>3/10/2025</a:t>
             </a:fld>
             <a:endParaRPr lang="en-US"/>
           </a:p>
@@ -5459,7 +4922,7 @@
           <a:p>
             <a:fld id="{0560A9CD-0304-4E0B-9E82-E7E0115DE05B}" type="datetimeFigureOut">
               <a:rPr lang="en-US" smtClean="0"/>
-              <a:t>11/20/2024</a:t>
+              <a:t>3/10/2025</a:t>
             </a:fld>
             <a:endParaRPr lang="en-US"/>
           </a:p>
@@ -5734,7 +5197,7 @@
           <a:p>
             <a:fld id="{0560A9CD-0304-4E0B-9E82-E7E0115DE05B}" type="datetimeFigureOut">
               <a:rPr lang="en-US" smtClean="0"/>
-              <a:t>11/20/2024</a:t>
+              <a:t>3/10/2025</a:t>
             </a:fld>
             <a:endParaRPr lang="en-US"/>
           </a:p>
@@ -5986,7 +5449,7 @@
           <a:p>
             <a:fld id="{0560A9CD-0304-4E0B-9E82-E7E0115DE05B}" type="datetimeFigureOut">
               <a:rPr lang="en-US" smtClean="0"/>
-              <a:t>11/20/2024</a:t>
+              <a:t>3/10/2025</a:t>
             </a:fld>
             <a:endParaRPr lang="en-US"/>
           </a:p>
@@ -6197,7 +5660,7 @@
           <a:p>
             <a:fld id="{0560A9CD-0304-4E0B-9E82-E7E0115DE05B}" type="datetimeFigureOut">
               <a:rPr lang="en-US" smtClean="0"/>
-              <a:t>11/20/2024</a:t>
+              <a:t>3/10/2025</a:t>
             </a:fld>
             <a:endParaRPr lang="en-US"/>
           </a:p>
@@ -38098,14 +37561,14 @@
           <p:nvPr>
             <p:extLst>
               <p:ext uri="{D42A27DB-BD31-4B8C-83A1-F6EECF244321}">
-                <p14:modId xmlns:p14="http://schemas.microsoft.com/office/powerpoint/2010/main" val="3409244432"/>
+                <p14:modId xmlns:p14="http://schemas.microsoft.com/office/powerpoint/2010/main" val="2001053168"/>
               </p:ext>
             </p:extLst>
           </p:nvPr>
         </p:nvGraphicFramePr>
         <p:xfrm>
           <a:off x="2386647" y="1945282"/>
-          <a:ext cx="7418705" cy="3931920"/>
+          <a:ext cx="7418705" cy="4206240"/>
         </p:xfrm>
         <a:graphic>
           <a:graphicData uri="http://schemas.openxmlformats.org/drawingml/2006/table">
@@ -38541,6 +38004,38 @@
                           <a:cs typeface="Courier New" panose="02070309020205020404" pitchFamily="49" charset="0"/>
                         </a:rPr>
                         <a:t>: division by zero</a:t>
+                      </a:r>
+                      <a:endParaRPr lang="en-US" sz="1800" b="1" baseline="0" dirty="0">
+                        <a:latin typeface="Courier New" panose="02070309020205020404" pitchFamily="49" charset="0"/>
+                        <a:cs typeface="Courier New" panose="02070309020205020404" pitchFamily="49" charset="0"/>
+                      </a:endParaRPr>
+                    </a:p>
+                    <a:p>
+                      <a:pPr marL="266700" marR="0" lvl="0" indent="-266700" algn="l" defTabSz="914400" rtl="0" eaLnBrk="1" fontAlgn="auto" latinLnBrk="0" hangingPunct="1">
+                        <a:lnSpc>
+                          <a:spcPct val="100000"/>
+                        </a:lnSpc>
+                        <a:spcBef>
+                          <a:spcPts val="0"/>
+                        </a:spcBef>
+                        <a:spcAft>
+                          <a:spcPts val="0"/>
+                        </a:spcAft>
+                        <a:buClr>
+                          <a:srgbClr val="C00000"/>
+                        </a:buClr>
+                        <a:buSzPct val="100000"/>
+                        <a:buFont typeface="Courier New" panose="02070309020205020404" pitchFamily="49" charset="0"/>
+                        <a:buChar char="&gt;"/>
+                        <a:tabLst/>
+                        <a:defRPr/>
+                      </a:pPr>
+                      <a:r>
+                        <a:rPr lang="en-US" sz="1800" b="1" baseline="0" dirty="0">
+                          <a:latin typeface="Courier New" panose="02070309020205020404" pitchFamily="49" charset="0"/>
+                          <a:cs typeface="Courier New" panose="02070309020205020404" pitchFamily="49" charset="0"/>
+                        </a:rPr>
+                        <a:t> </a:t>
                       </a:r>
                     </a:p>
                   </a:txBody>

</xml_diff>

<commit_message>
project-4-mnist.md all-slides.pdf code.zip exceptions.pdf exceptions.pptx testing.pdf testing.pptx
</commit_message>
<xml_diff>
--- a/ipsa/slides/exceptions.pptx
+++ b/ipsa/slides/exceptions.pptx
@@ -147,7 +147,7 @@
 <file path=ppt/revisionInfo.xml><?xml version="1.0" encoding="utf-8"?>
 <p1510:revInfo xmlns:a="http://schemas.openxmlformats.org/drawingml/2006/main" xmlns:r="http://schemas.openxmlformats.org/officeDocument/2006/relationships" xmlns:p1510="http://schemas.microsoft.com/office/powerpoint/2015/10/main">
   <p1510:revLst>
-    <p1510:client id="{9F458CB3-E497-4EBE-93FC-6326415FF9FB}" v="4" dt="2025-03-10T06:58:25.393"/>
+    <p1510:client id="{9F458CB3-E497-4EBE-93FC-6326415FF9FB}" v="5" dt="2025-03-12T07:34:22.221"/>
   </p1510:revLst>
 </p1510:revInfo>
 </file>
@@ -156,8 +156,8 @@
 <pc:chgInfo xmlns:a="http://schemas.openxmlformats.org/drawingml/2006/main" xmlns:r="http://schemas.openxmlformats.org/officeDocument/2006/relationships" xmlns:ac="http://schemas.microsoft.com/office/drawing/2013/main/command" xmlns:pc="http://schemas.microsoft.com/office/powerpoint/2013/main/command">
   <pc:docChgLst>
     <pc:chgData name="Gerth Stølting Brodal" userId="04ef4784-6591-4f86-a140-f5c3b108582a" providerId="ADAL" clId="{9F458CB3-E497-4EBE-93FC-6326415FF9FB}"/>
-    <pc:docChg chg="custSel modSld">
-      <pc:chgData name="Gerth Stølting Brodal" userId="04ef4784-6591-4f86-a140-f5c3b108582a" providerId="ADAL" clId="{9F458CB3-E497-4EBE-93FC-6326415FF9FB}" dt="2025-03-10T06:59:00.692" v="85" actId="20577"/>
+    <pc:docChg chg="undo custSel modSld">
+      <pc:chgData name="Gerth Stølting Brodal" userId="04ef4784-6591-4f86-a140-f5c3b108582a" providerId="ADAL" clId="{9F458CB3-E497-4EBE-93FC-6326415FF9FB}" dt="2025-03-12T07:34:46.944" v="146" actId="20577"/>
       <pc:docMkLst>
         <pc:docMk/>
       </pc:docMkLst>
@@ -172,6 +172,21 @@
           <ac:graphicFrameMkLst>
             <pc:docMk/>
             <pc:sldMk cId="1654434957" sldId="704"/>
+            <ac:graphicFrameMk id="4" creationId="{00000000-0000-0000-0000-000000000000}"/>
+          </ac:graphicFrameMkLst>
+        </pc:graphicFrameChg>
+      </pc:sldChg>
+      <pc:sldChg chg="modSp mod">
+        <pc:chgData name="Gerth Stølting Brodal" userId="04ef4784-6591-4f86-a140-f5c3b108582a" providerId="ADAL" clId="{9F458CB3-E497-4EBE-93FC-6326415FF9FB}" dt="2025-03-12T07:34:46.944" v="146" actId="20577"/>
+        <pc:sldMkLst>
+          <pc:docMk/>
+          <pc:sldMk cId="928740216" sldId="729"/>
+        </pc:sldMkLst>
+        <pc:graphicFrameChg chg="mod modGraphic">
+          <ac:chgData name="Gerth Stølting Brodal" userId="04ef4784-6591-4f86-a140-f5c3b108582a" providerId="ADAL" clId="{9F458CB3-E497-4EBE-93FC-6326415FF9FB}" dt="2025-03-12T07:34:46.944" v="146" actId="20577"/>
+          <ac:graphicFrameMkLst>
+            <pc:docMk/>
+            <pc:sldMk cId="928740216" sldId="729"/>
             <ac:graphicFrameMk id="4" creationId="{00000000-0000-0000-0000-000000000000}"/>
           </ac:graphicFrameMkLst>
         </pc:graphicFrameChg>
@@ -665,7 +680,7 @@
           <a:p>
             <a:fld id="{FB1A172F-81D4-4DC4-9113-1DBD56EC3646}" type="datetimeFigureOut">
               <a:rPr lang="en-US" smtClean="0"/>
-              <a:t>3/10/2025</a:t>
+              <a:t>3/12/2025</a:t>
             </a:fld>
             <a:endParaRPr lang="en-US"/>
           </a:p>
@@ -3343,7 +3358,7 @@
           <a:p>
             <a:fld id="{0560A9CD-0304-4E0B-9E82-E7E0115DE05B}" type="datetimeFigureOut">
               <a:rPr lang="en-US" smtClean="0"/>
-              <a:t>3/10/2025</a:t>
+              <a:t>3/12/2025</a:t>
             </a:fld>
             <a:endParaRPr lang="en-US"/>
           </a:p>
@@ -3511,7 +3526,7 @@
           <a:p>
             <a:fld id="{0560A9CD-0304-4E0B-9E82-E7E0115DE05B}" type="datetimeFigureOut">
               <a:rPr lang="en-US" smtClean="0"/>
-              <a:t>3/10/2025</a:t>
+              <a:t>3/12/2025</a:t>
             </a:fld>
             <a:endParaRPr lang="en-US"/>
           </a:p>
@@ -3689,7 +3704,7 @@
           <a:p>
             <a:fld id="{0560A9CD-0304-4E0B-9E82-E7E0115DE05B}" type="datetimeFigureOut">
               <a:rPr lang="en-US" smtClean="0"/>
-              <a:t>3/10/2025</a:t>
+              <a:t>3/12/2025</a:t>
             </a:fld>
             <a:endParaRPr lang="en-US"/>
           </a:p>
@@ -3872,7 +3887,7 @@
           <a:p>
             <a:fld id="{0560A9CD-0304-4E0B-9E82-E7E0115DE05B}" type="datetimeFigureOut">
               <a:rPr lang="en-US" smtClean="0"/>
-              <a:t>3/10/2025</a:t>
+              <a:t>3/12/2025</a:t>
             </a:fld>
             <a:endParaRPr lang="en-US"/>
           </a:p>
@@ -4117,7 +4132,7 @@
           <a:p>
             <a:fld id="{0560A9CD-0304-4E0B-9E82-E7E0115DE05B}" type="datetimeFigureOut">
               <a:rPr lang="en-US" smtClean="0"/>
-              <a:t>3/10/2025</a:t>
+              <a:t>3/12/2025</a:t>
             </a:fld>
             <a:endParaRPr lang="en-US"/>
           </a:p>
@@ -4346,7 +4361,7 @@
           <a:p>
             <a:fld id="{0560A9CD-0304-4E0B-9E82-E7E0115DE05B}" type="datetimeFigureOut">
               <a:rPr lang="en-US" smtClean="0"/>
-              <a:t>3/10/2025</a:t>
+              <a:t>3/12/2025</a:t>
             </a:fld>
             <a:endParaRPr lang="en-US"/>
           </a:p>
@@ -4710,7 +4725,7 @@
           <a:p>
             <a:fld id="{0560A9CD-0304-4E0B-9E82-E7E0115DE05B}" type="datetimeFigureOut">
               <a:rPr lang="en-US" smtClean="0"/>
-              <a:t>3/10/2025</a:t>
+              <a:t>3/12/2025</a:t>
             </a:fld>
             <a:endParaRPr lang="en-US"/>
           </a:p>
@@ -4827,7 +4842,7 @@
           <a:p>
             <a:fld id="{0560A9CD-0304-4E0B-9E82-E7E0115DE05B}" type="datetimeFigureOut">
               <a:rPr lang="en-US" smtClean="0"/>
-              <a:t>3/10/2025</a:t>
+              <a:t>3/12/2025</a:t>
             </a:fld>
             <a:endParaRPr lang="en-US"/>
           </a:p>
@@ -4922,7 +4937,7 @@
           <a:p>
             <a:fld id="{0560A9CD-0304-4E0B-9E82-E7E0115DE05B}" type="datetimeFigureOut">
               <a:rPr lang="en-US" smtClean="0"/>
-              <a:t>3/10/2025</a:t>
+              <a:t>3/12/2025</a:t>
             </a:fld>
             <a:endParaRPr lang="en-US"/>
           </a:p>
@@ -5197,7 +5212,7 @@
           <a:p>
             <a:fld id="{0560A9CD-0304-4E0B-9E82-E7E0115DE05B}" type="datetimeFigureOut">
               <a:rPr lang="en-US" smtClean="0"/>
-              <a:t>3/10/2025</a:t>
+              <a:t>3/12/2025</a:t>
             </a:fld>
             <a:endParaRPr lang="en-US"/>
           </a:p>
@@ -5449,7 +5464,7 @@
           <a:p>
             <a:fld id="{0560A9CD-0304-4E0B-9E82-E7E0115DE05B}" type="datetimeFigureOut">
               <a:rPr lang="en-US" smtClean="0"/>
-              <a:t>3/10/2025</a:t>
+              <a:t>3/12/2025</a:t>
             </a:fld>
             <a:endParaRPr lang="en-US"/>
           </a:p>
@@ -5660,7 +5675,7 @@
           <a:p>
             <a:fld id="{0560A9CD-0304-4E0B-9E82-E7E0115DE05B}" type="datetimeFigureOut">
               <a:rPr lang="en-US" smtClean="0"/>
-              <a:t>3/10/2025</a:t>
+              <a:t>3/12/2025</a:t>
             </a:fld>
             <a:endParaRPr lang="en-US"/>
           </a:p>
@@ -31178,7 +31193,13 @@
           <p:cNvGraphicFramePr>
             <a:graphicFrameLocks noGrp="1"/>
           </p:cNvGraphicFramePr>
-          <p:nvPr/>
+          <p:nvPr>
+            <p:extLst>
+              <p:ext uri="{D42A27DB-BD31-4B8C-83A1-F6EECF244321}">
+                <p14:modId xmlns:p14="http://schemas.microsoft.com/office/powerpoint/2010/main" val="3604228525"/>
+              </p:ext>
+            </p:extLst>
+          </p:nvPr>
         </p:nvGraphicFramePr>
         <p:xfrm>
           <a:off x="4199064" y="30480"/>
@@ -31919,10 +31940,22 @@
                       </a:r>
                     </a:p>
                     <a:p>
-                      <a:pPr>
+                      <a:pPr marL="0" marR="0" lvl="0" indent="0" algn="l" defTabSz="914400" rtl="0" eaLnBrk="1" fontAlgn="auto" latinLnBrk="0" hangingPunct="1">
+                        <a:lnSpc>
+                          <a:spcPct val="100000"/>
+                        </a:lnSpc>
+                        <a:spcBef>
+                          <a:spcPts val="0"/>
+                        </a:spcBef>
                         <a:spcAft>
                           <a:spcPts val="0"/>
                         </a:spcAft>
+                        <a:buClrTx/>
+                        <a:buSzTx/>
+                        <a:buFontTx/>
+                        <a:buNone/>
+                        <a:tabLst/>
+                        <a:defRPr/>
                       </a:pPr>
                       <a:r>
                         <a:rPr lang="en-US" sz="1400" b="1" dirty="0">
@@ -32026,8 +32059,36 @@
                           <a:latin typeface="Courier New" panose="02070309020205020404" pitchFamily="49" charset="0"/>
                           <a:cs typeface="Courier New" panose="02070309020205020404" pitchFamily="49" charset="0"/>
                         </a:rPr>
-                        <a:t>:</a:t>
-                      </a:r>
+                        <a:t>:  </a:t>
+                      </a:r>
+                      <a:r>
+                        <a:rPr lang="en-US" sz="1400" b="1" dirty="0">
+                          <a:solidFill>
+                            <a:schemeClr val="bg1">
+                              <a:lumMod val="50000"/>
+                            </a:schemeClr>
+                          </a:solidFill>
+                          <a:latin typeface="Courier New" panose="02070309020205020404" pitchFamily="49" charset="0"/>
+                          <a:cs typeface="Courier New" panose="02070309020205020404" pitchFamily="49" charset="0"/>
+                        </a:rPr>
+                        <a:t># a dictionary containing at </a:t>
+                      </a:r>
+                      <a:r>
+                        <a:rPr lang="en-US" sz="1400" b="1">
+                          <a:solidFill>
+                            <a:schemeClr val="bg1">
+                              <a:lumMod val="50000"/>
+                            </a:schemeClr>
+                          </a:solidFill>
+                          <a:latin typeface="Courier New" panose="02070309020205020404" pitchFamily="49" charset="0"/>
+                          <a:cs typeface="Courier New" panose="02070309020205020404" pitchFamily="49" charset="0"/>
+                        </a:rPr>
+                        <a:t>least two keys</a:t>
+                      </a:r>
+                      <a:endParaRPr lang="en-US" sz="1400" b="1" dirty="0">
+                        <a:latin typeface="Courier New" panose="02070309020205020404" pitchFamily="49" charset="0"/>
+                        <a:cs typeface="Courier New" panose="02070309020205020404" pitchFamily="49" charset="0"/>
+                      </a:endParaRPr>
                     </a:p>
                     <a:p>
                       <a:pPr>

</xml_diff>